<commit_message>
text file with credentials. resolved file conflicts in formula data downloads.
</commit_message>
<xml_diff>
--- a/Impact Evaluation with Routine Facility Data.pptx
+++ b/Impact Evaluation with Routine Facility Data.pptx
@@ -142,7 +142,7 @@
   <pc:docChgLst>
     <pc:chgData name="Painter, John (CDC/DDPHSIS/CGH/DPDM)" userId="b464b4a6-ef68-4515-b6b1-8c9a49b95636" providerId="ADAL" clId="{6E2ED643-EFA7-4A71-96C4-1A84DDCF61A9}"/>
     <pc:docChg chg="undo redo custSel addSld delSld modSld sldOrd">
-      <pc:chgData name="Painter, John (CDC/DDPHSIS/CGH/DPDM)" userId="b464b4a6-ef68-4515-b6b1-8c9a49b95636" providerId="ADAL" clId="{6E2ED643-EFA7-4A71-96C4-1A84DDCF61A9}" dt="2021-07-30T19:49:01.697" v="10889" actId="14100"/>
+      <pc:chgData name="Painter, John (CDC/DDPHSIS/CGH/DPDM)" userId="b464b4a6-ef68-4515-b6b1-8c9a49b95636" providerId="ADAL" clId="{6E2ED643-EFA7-4A71-96C4-1A84DDCF61A9}" dt="2021-08-16T14:57:30.873" v="11045" actId="1035"/>
       <pc:docMkLst>
         <pc:docMk/>
       </pc:docMkLst>
@@ -507,7 +507,7 @@
         </pc:spChg>
       </pc:sldChg>
       <pc:sldChg chg="addSp delSp modSp new mod">
-        <pc:chgData name="Painter, John (CDC/DDPHSIS/CGH/DPDM)" userId="b464b4a6-ef68-4515-b6b1-8c9a49b95636" providerId="ADAL" clId="{6E2ED643-EFA7-4A71-96C4-1A84DDCF61A9}" dt="2021-07-30T18:50:34.475" v="7360" actId="14100"/>
+        <pc:chgData name="Painter, John (CDC/DDPHSIS/CGH/DPDM)" userId="b464b4a6-ef68-4515-b6b1-8c9a49b95636" providerId="ADAL" clId="{6E2ED643-EFA7-4A71-96C4-1A84DDCF61A9}" dt="2021-08-16T14:57:30.873" v="11045" actId="1035"/>
         <pc:sldMkLst>
           <pc:docMk/>
           <pc:sldMk cId="2326141710" sldId="265"/>
@@ -521,7 +521,7 @@
           </ac:spMkLst>
         </pc:spChg>
         <pc:spChg chg="mod">
-          <ac:chgData name="Painter, John (CDC/DDPHSIS/CGH/DPDM)" userId="b464b4a6-ef68-4515-b6b1-8c9a49b95636" providerId="ADAL" clId="{6E2ED643-EFA7-4A71-96C4-1A84DDCF61A9}" dt="2021-07-30T18:48:14.386" v="7305" actId="20577"/>
+          <ac:chgData name="Painter, John (CDC/DDPHSIS/CGH/DPDM)" userId="b464b4a6-ef68-4515-b6b1-8c9a49b95636" providerId="ADAL" clId="{6E2ED643-EFA7-4A71-96C4-1A84DDCF61A9}" dt="2021-08-16T14:52:22.904" v="10992" actId="20577"/>
           <ac:spMkLst>
             <pc:docMk/>
             <pc:sldMk cId="2326141710" sldId="265"/>
@@ -544,16 +544,16 @@
             <ac:spMk id="5" creationId="{93964FF6-F9F5-40D9-A99C-7FEA879B7B70}"/>
           </ac:spMkLst>
         </pc:spChg>
-        <pc:spChg chg="add mod">
-          <ac:chgData name="Painter, John (CDC/DDPHSIS/CGH/DPDM)" userId="b464b4a6-ef68-4515-b6b1-8c9a49b95636" providerId="ADAL" clId="{6E2ED643-EFA7-4A71-96C4-1A84DDCF61A9}" dt="2021-07-30T18:37:09.670" v="6984" actId="20577"/>
+        <pc:spChg chg="add del mod">
+          <ac:chgData name="Painter, John (CDC/DDPHSIS/CGH/DPDM)" userId="b464b4a6-ef68-4515-b6b1-8c9a49b95636" providerId="ADAL" clId="{6E2ED643-EFA7-4A71-96C4-1A84DDCF61A9}" dt="2021-08-16T14:51:59.927" v="10975" actId="478"/>
           <ac:spMkLst>
             <pc:docMk/>
             <pc:sldMk cId="2326141710" sldId="265"/>
             <ac:spMk id="12" creationId="{FE1F5A16-5116-4301-8F40-61AE53CA0E2B}"/>
           </ac:spMkLst>
         </pc:spChg>
-        <pc:spChg chg="add mod">
-          <ac:chgData name="Painter, John (CDC/DDPHSIS/CGH/DPDM)" userId="b464b4a6-ef68-4515-b6b1-8c9a49b95636" providerId="ADAL" clId="{6E2ED643-EFA7-4A71-96C4-1A84DDCF61A9}" dt="2021-07-30T18:37:43.395" v="7006" actId="1036"/>
+        <pc:spChg chg="add del mod">
+          <ac:chgData name="Painter, John (CDC/DDPHSIS/CGH/DPDM)" userId="b464b4a6-ef68-4515-b6b1-8c9a49b95636" providerId="ADAL" clId="{6E2ED643-EFA7-4A71-96C4-1A84DDCF61A9}" dt="2021-08-16T14:52:04.087" v="10977" actId="478"/>
           <ac:spMkLst>
             <pc:docMk/>
             <pc:sldMk cId="2326141710" sldId="265"/>
@@ -569,7 +569,7 @@
           </ac:spMkLst>
         </pc:spChg>
         <pc:spChg chg="add mod">
-          <ac:chgData name="Painter, John (CDC/DDPHSIS/CGH/DPDM)" userId="b464b4a6-ef68-4515-b6b1-8c9a49b95636" providerId="ADAL" clId="{6E2ED643-EFA7-4A71-96C4-1A84DDCF61A9}" dt="2021-07-30T18:49:53.850" v="7319" actId="14100"/>
+          <ac:chgData name="Painter, John (CDC/DDPHSIS/CGH/DPDM)" userId="b464b4a6-ef68-4515-b6b1-8c9a49b95636" providerId="ADAL" clId="{6E2ED643-EFA7-4A71-96C4-1A84DDCF61A9}" dt="2021-08-16T14:57:30.873" v="11045" actId="1035"/>
           <ac:spMkLst>
             <pc:docMk/>
             <pc:sldMk cId="2326141710" sldId="265"/>
@@ -577,7 +577,7 @@
           </ac:spMkLst>
         </pc:spChg>
         <pc:spChg chg="add mod">
-          <ac:chgData name="Painter, John (CDC/DDPHSIS/CGH/DPDM)" userId="b464b4a6-ef68-4515-b6b1-8c9a49b95636" providerId="ADAL" clId="{6E2ED643-EFA7-4A71-96C4-1A84DDCF61A9}" dt="2021-07-30T18:50:28.804" v="7359" actId="20577"/>
+          <ac:chgData name="Painter, John (CDC/DDPHSIS/CGH/DPDM)" userId="b464b4a6-ef68-4515-b6b1-8c9a49b95636" providerId="ADAL" clId="{6E2ED643-EFA7-4A71-96C4-1A84DDCF61A9}" dt="2021-08-16T14:57:30.873" v="11045" actId="1035"/>
           <ac:spMkLst>
             <pc:docMk/>
             <pc:sldMk cId="2326141710" sldId="265"/>
@@ -585,7 +585,7 @@
           </ac:spMkLst>
         </pc:spChg>
         <pc:spChg chg="add mod">
-          <ac:chgData name="Painter, John (CDC/DDPHSIS/CGH/DPDM)" userId="b464b4a6-ef68-4515-b6b1-8c9a49b95636" providerId="ADAL" clId="{6E2ED643-EFA7-4A71-96C4-1A84DDCF61A9}" dt="2021-07-30T18:50:34.475" v="7360" actId="14100"/>
+          <ac:chgData name="Painter, John (CDC/DDPHSIS/CGH/DPDM)" userId="b464b4a6-ef68-4515-b6b1-8c9a49b95636" providerId="ADAL" clId="{6E2ED643-EFA7-4A71-96C4-1A84DDCF61A9}" dt="2021-08-16T14:57:30.873" v="11045" actId="1035"/>
           <ac:spMkLst>
             <pc:docMk/>
             <pc:sldMk cId="2326141710" sldId="265"/>
@@ -593,7 +593,7 @@
           </ac:spMkLst>
         </pc:spChg>
         <pc:spChg chg="add mod">
-          <ac:chgData name="Painter, John (CDC/DDPHSIS/CGH/DPDM)" userId="b464b4a6-ef68-4515-b6b1-8c9a49b95636" providerId="ADAL" clId="{6E2ED643-EFA7-4A71-96C4-1A84DDCF61A9}" dt="2021-07-30T18:50:27.123" v="7358" actId="20577"/>
+          <ac:chgData name="Painter, John (CDC/DDPHSIS/CGH/DPDM)" userId="b464b4a6-ef68-4515-b6b1-8c9a49b95636" providerId="ADAL" clId="{6E2ED643-EFA7-4A71-96C4-1A84DDCF61A9}" dt="2021-08-16T14:57:30.873" v="11045" actId="1035"/>
           <ac:spMkLst>
             <pc:docMk/>
             <pc:sldMk cId="2326141710" sldId="265"/>
@@ -617,7 +617,7 @@
           </ac:picMkLst>
         </pc:picChg>
         <pc:picChg chg="add mod modCrop">
-          <ac:chgData name="Painter, John (CDC/DDPHSIS/CGH/DPDM)" userId="b464b4a6-ef68-4515-b6b1-8c9a49b95636" providerId="ADAL" clId="{6E2ED643-EFA7-4A71-96C4-1A84DDCF61A9}" dt="2021-07-30T18:48:01.785" v="7292" actId="1076"/>
+          <ac:chgData name="Painter, John (CDC/DDPHSIS/CGH/DPDM)" userId="b464b4a6-ef68-4515-b6b1-8c9a49b95636" providerId="ADAL" clId="{6E2ED643-EFA7-4A71-96C4-1A84DDCF61A9}" dt="2021-08-16T14:57:21.288" v="11024" actId="1076"/>
           <ac:picMkLst>
             <pc:docMk/>
             <pc:sldMk cId="2326141710" sldId="265"/>
@@ -1424,7 +1424,7 @@
           <a:p>
             <a:fld id="{4BD852C0-FD4D-4060-A4DD-317B17FFE4FA}" type="datetimeFigureOut">
               <a:rPr lang="en-US" smtClean="0"/>
-              <a:t>7/30/2021</a:t>
+              <a:t>8/16/2021</a:t>
             </a:fld>
             <a:endParaRPr lang="en-US"/>
           </a:p>
@@ -1622,7 +1622,7 @@
           <a:p>
             <a:fld id="{4BD852C0-FD4D-4060-A4DD-317B17FFE4FA}" type="datetimeFigureOut">
               <a:rPr lang="en-US" smtClean="0"/>
-              <a:t>7/30/2021</a:t>
+              <a:t>8/16/2021</a:t>
             </a:fld>
             <a:endParaRPr lang="en-US"/>
           </a:p>
@@ -1830,7 +1830,7 @@
           <a:p>
             <a:fld id="{4BD852C0-FD4D-4060-A4DD-317B17FFE4FA}" type="datetimeFigureOut">
               <a:rPr lang="en-US" smtClean="0"/>
-              <a:t>7/30/2021</a:t>
+              <a:t>8/16/2021</a:t>
             </a:fld>
             <a:endParaRPr lang="en-US"/>
           </a:p>
@@ -2028,7 +2028,7 @@
           <a:p>
             <a:fld id="{4BD852C0-FD4D-4060-A4DD-317B17FFE4FA}" type="datetimeFigureOut">
               <a:rPr lang="en-US" smtClean="0"/>
-              <a:t>7/30/2021</a:t>
+              <a:t>8/16/2021</a:t>
             </a:fld>
             <a:endParaRPr lang="en-US"/>
           </a:p>
@@ -2303,7 +2303,7 @@
           <a:p>
             <a:fld id="{4BD852C0-FD4D-4060-A4DD-317B17FFE4FA}" type="datetimeFigureOut">
               <a:rPr lang="en-US" smtClean="0"/>
-              <a:t>7/30/2021</a:t>
+              <a:t>8/16/2021</a:t>
             </a:fld>
             <a:endParaRPr lang="en-US"/>
           </a:p>
@@ -2568,7 +2568,7 @@
           <a:p>
             <a:fld id="{4BD852C0-FD4D-4060-A4DD-317B17FFE4FA}" type="datetimeFigureOut">
               <a:rPr lang="en-US" smtClean="0"/>
-              <a:t>7/30/2021</a:t>
+              <a:t>8/16/2021</a:t>
             </a:fld>
             <a:endParaRPr lang="en-US"/>
           </a:p>
@@ -2980,7 +2980,7 @@
           <a:p>
             <a:fld id="{4BD852C0-FD4D-4060-A4DD-317B17FFE4FA}" type="datetimeFigureOut">
               <a:rPr lang="en-US" smtClean="0"/>
-              <a:t>7/30/2021</a:t>
+              <a:t>8/16/2021</a:t>
             </a:fld>
             <a:endParaRPr lang="en-US"/>
           </a:p>
@@ -3121,7 +3121,7 @@
           <a:p>
             <a:fld id="{4BD852C0-FD4D-4060-A4DD-317B17FFE4FA}" type="datetimeFigureOut">
               <a:rPr lang="en-US" smtClean="0"/>
-              <a:t>7/30/2021</a:t>
+              <a:t>8/16/2021</a:t>
             </a:fld>
             <a:endParaRPr lang="en-US"/>
           </a:p>
@@ -3234,7 +3234,7 @@
           <a:p>
             <a:fld id="{4BD852C0-FD4D-4060-A4DD-317B17FFE4FA}" type="datetimeFigureOut">
               <a:rPr lang="en-US" smtClean="0"/>
-              <a:t>7/30/2021</a:t>
+              <a:t>8/16/2021</a:t>
             </a:fld>
             <a:endParaRPr lang="en-US"/>
           </a:p>
@@ -3545,7 +3545,7 @@
           <a:p>
             <a:fld id="{4BD852C0-FD4D-4060-A4DD-317B17FFE4FA}" type="datetimeFigureOut">
               <a:rPr lang="en-US" smtClean="0"/>
-              <a:t>7/30/2021</a:t>
+              <a:t>8/16/2021</a:t>
             </a:fld>
             <a:endParaRPr lang="en-US"/>
           </a:p>
@@ -3833,7 +3833,7 @@
           <a:p>
             <a:fld id="{4BD852C0-FD4D-4060-A4DD-317B17FFE4FA}" type="datetimeFigureOut">
               <a:rPr lang="en-US" smtClean="0"/>
-              <a:t>7/30/2021</a:t>
+              <a:t>8/16/2021</a:t>
             </a:fld>
             <a:endParaRPr lang="en-US"/>
           </a:p>
@@ -4074,7 +4074,7 @@
           <a:p>
             <a:fld id="{4BD852C0-FD4D-4060-A4DD-317B17FFE4FA}" type="datetimeFigureOut">
               <a:rPr lang="en-US" smtClean="0"/>
-              <a:t>7/30/2021</a:t>
+              <a:t>8/16/2021</a:t>
             </a:fld>
             <a:endParaRPr lang="en-US"/>
           </a:p>
@@ -9205,43 +9205,27 @@
           <a:p>
             <a:r>
               <a:rPr lang="en-US" dirty="0"/>
-              <a:t> At top of file (under setup), fill in NULL values.  </a:t>
-            </a:r>
-          </a:p>
-          <a:p>
-            <a:pPr lvl="1"/>
-            <a:r>
-              <a:rPr lang="en-US" dirty="0"/>
-              <a:t>Example: country = NULL           country = "DRC"</a:t>
-            </a:r>
-          </a:p>
-          <a:p>
-            <a:pPr lvl="1"/>
-            <a:r>
-              <a:rPr lang="en-US" dirty="0" err="1"/>
-              <a:t>country.dir</a:t>
-            </a:r>
-            <a:r>
-              <a:rPr lang="en-US" dirty="0"/>
-              <a:t> = NULL          </a:t>
-            </a:r>
-            <a:r>
-              <a:rPr lang="en-US" dirty="0" err="1"/>
-              <a:t>country.dir</a:t>
-            </a:r>
-            <a:r>
-              <a:rPr lang="en-US" dirty="0"/>
-              <a:t> = ‘C:/Users/bzp3/Projects/DRC’  </a:t>
-            </a:r>
-          </a:p>
-          <a:p>
-            <a:pPr marL="457200" lvl="1" indent="0">
-              <a:buNone/>
-            </a:pPr>
-            <a:r>
-              <a:rPr lang="en-US" sz="1600" dirty="0"/>
-              <a:t>[ note: In R, single backslash (\) slashes need to be replaced with either double back slash (\\), or forward slash(/) ]</a:t>
-            </a:r>
+              <a:t>Locate file </a:t>
+            </a:r>
+            <a:r>
+              <a:rPr lang="en-US" dirty="0">
+                <a:solidFill>
+                  <a:srgbClr val="FF0000"/>
+                </a:solidFill>
+              </a:rPr>
+              <a:t>DHIS2details.txt </a:t>
+            </a:r>
+            <a:r>
+              <a:rPr lang="en-US" dirty="0"/>
+              <a:t>and modify as needed (then save)</a:t>
+            </a:r>
+            <a:endParaRPr lang="en-US" i="1" dirty="0">
+              <a:solidFill>
+                <a:schemeClr val="accent2">
+                  <a:lumMod val="75000"/>
+                </a:schemeClr>
+              </a:solidFill>
+            </a:endParaRPr>
           </a:p>
           <a:p>
             <a:r>
@@ -9325,7 +9309,7 @@
         </p:blipFill>
         <p:spPr>
           <a:xfrm>
-            <a:off x="7290223" y="4001294"/>
+            <a:off x="7290223" y="2872886"/>
             <a:ext cx="2692078" cy="1415006"/>
           </a:xfrm>
           <a:prstGeom prst="rect">
@@ -9335,10 +9319,10 @@
       </p:pic>
       <p:sp>
         <p:nvSpPr>
-          <p:cNvPr id="12" name="Arrow: Right 11">
-            <a:extLst>
-              <a:ext uri="{FF2B5EF4-FFF2-40B4-BE49-F238E27FC236}">
-                <a16:creationId xmlns:a16="http://schemas.microsoft.com/office/drawing/2014/main" id="{FE1F5A16-5116-4301-8F40-61AE53CA0E2B}"/>
+          <p:cNvPr id="15" name="Right Brace 14">
+            <a:extLst>
+              <a:ext uri="{FF2B5EF4-FFF2-40B4-BE49-F238E27FC236}">
+                <a16:creationId xmlns:a16="http://schemas.microsoft.com/office/drawing/2014/main" id="{81924DD0-9F53-48E2-9D2F-FE871FDA0A69}"/>
               </a:ext>
             </a:extLst>
           </p:cNvPr>
@@ -9346,106 +9330,8 @@
           <p:nvPr/>
         </p:nvSpPr>
         <p:spPr>
-          <a:xfrm>
-            <a:off x="4941651" y="2901731"/>
-            <a:ext cx="291830" cy="204281"/>
-          </a:xfrm>
-          <a:prstGeom prst="rightArrow">
-            <a:avLst/>
-          </a:prstGeom>
-        </p:spPr>
-        <p:style>
-          <a:lnRef idx="2">
-            <a:schemeClr val="accent1">
-              <a:shade val="50000"/>
-            </a:schemeClr>
-          </a:lnRef>
-          <a:fillRef idx="1">
-            <a:schemeClr val="accent1"/>
-          </a:fillRef>
-          <a:effectRef idx="0">
-            <a:schemeClr val="accent1"/>
-          </a:effectRef>
-          <a:fontRef idx="minor">
-            <a:schemeClr val="lt1"/>
-          </a:fontRef>
-        </p:style>
-        <p:txBody>
-          <a:bodyPr rtlCol="0" anchor="ctr"/>
-          <a:lstStyle/>
-          <a:p>
-            <a:pPr algn="ctr"/>
-            <a:r>
-              <a:rPr lang="en-US" dirty="0"/>
-              <a:t>C</a:t>
-            </a:r>
-          </a:p>
-        </p:txBody>
-      </p:sp>
-      <p:sp>
-        <p:nvSpPr>
-          <p:cNvPr id="13" name="Arrow: Right 12">
-            <a:extLst>
-              <a:ext uri="{FF2B5EF4-FFF2-40B4-BE49-F238E27FC236}">
-                <a16:creationId xmlns:a16="http://schemas.microsoft.com/office/drawing/2014/main" id="{B4089884-E669-41D5-8235-83E83C9F494E}"/>
-              </a:ext>
-            </a:extLst>
-          </p:cNvPr>
-          <p:cNvSpPr/>
-          <p:nvPr/>
-        </p:nvSpPr>
-        <p:spPr>
-          <a:xfrm>
-            <a:off x="4121285" y="3284725"/>
-            <a:ext cx="291830" cy="204281"/>
-          </a:xfrm>
-          <a:prstGeom prst="rightArrow">
-            <a:avLst/>
-          </a:prstGeom>
-        </p:spPr>
-        <p:style>
-          <a:lnRef idx="2">
-            <a:schemeClr val="accent1">
-              <a:shade val="50000"/>
-            </a:schemeClr>
-          </a:lnRef>
-          <a:fillRef idx="1">
-            <a:schemeClr val="accent1"/>
-          </a:fillRef>
-          <a:effectRef idx="0">
-            <a:schemeClr val="accent1"/>
-          </a:effectRef>
-          <a:fontRef idx="minor">
-            <a:schemeClr val="lt1"/>
-          </a:fontRef>
-        </p:style>
-        <p:txBody>
-          <a:bodyPr rtlCol="0" anchor="ctr"/>
-          <a:lstStyle/>
-          <a:p>
-            <a:pPr algn="ctr"/>
-            <a:r>
-              <a:rPr lang="en-US" dirty="0"/>
-              <a:t>C</a:t>
-            </a:r>
-          </a:p>
-        </p:txBody>
-      </p:sp>
-      <p:sp>
-        <p:nvSpPr>
-          <p:cNvPr id="15" name="Right Brace 14">
-            <a:extLst>
-              <a:ext uri="{FF2B5EF4-FFF2-40B4-BE49-F238E27FC236}">
-                <a16:creationId xmlns:a16="http://schemas.microsoft.com/office/drawing/2014/main" id="{81924DD0-9F53-48E2-9D2F-FE871FDA0A69}"/>
-              </a:ext>
-            </a:extLst>
-          </p:cNvPr>
-          <p:cNvSpPr/>
-          <p:nvPr/>
-        </p:nvSpPr>
-        <p:spPr>
           <a:xfrm rot="5400000">
-            <a:off x="6148058" y="5169736"/>
+            <a:off x="6148058" y="4226144"/>
             <a:ext cx="227587" cy="2056742"/>
           </a:xfrm>
           <a:prstGeom prst="rightBrace">
@@ -9490,7 +9376,7 @@
         </p:nvSpPr>
         <p:spPr>
           <a:xfrm>
-            <a:off x="5311303" y="6445586"/>
+            <a:off x="5311303" y="5501994"/>
             <a:ext cx="1922129" cy="369332"/>
           </a:xfrm>
           <a:prstGeom prst="rect">
@@ -9525,7 +9411,7 @@
         </p:nvSpPr>
         <p:spPr>
           <a:xfrm rot="5400000">
-            <a:off x="8012046" y="5538845"/>
+            <a:off x="8012046" y="4595253"/>
             <a:ext cx="227586" cy="1316477"/>
           </a:xfrm>
           <a:prstGeom prst="rightBrace">
@@ -9570,7 +9456,7 @@
         </p:nvSpPr>
         <p:spPr>
           <a:xfrm>
-            <a:off x="7545422" y="6444562"/>
+            <a:off x="7545422" y="5500970"/>
             <a:ext cx="1615442" cy="369332"/>
           </a:xfrm>
           <a:prstGeom prst="rect">

</xml_diff>